<commit_message>
update entregaveis sprint 2
</commit_message>
<xml_diff>
--- a/Sprint1/Atividade 01 - PI.pptx
+++ b/Sprint1/Atividade 01 - PI.pptx
@@ -122,6 +122,35 @@
 </p:presentation>
 </file>
 
+<file path=ppt/changesInfos/changesInfo1.xml><?xml version="1.0" encoding="utf-8"?>
+<pc:chgInfo xmlns:a="http://schemas.openxmlformats.org/drawingml/2006/main" xmlns:r="http://schemas.openxmlformats.org/officeDocument/2006/relationships" xmlns:ac="http://schemas.microsoft.com/office/drawing/2013/main/command" xmlns:pc="http://schemas.microsoft.com/office/powerpoint/2013/main/command">
+  <pc:docChgLst>
+    <pc:chgData name="Raul Meira de Souza" userId="0b810766-76aa-4ac6-b01e-c80b8c896654" providerId="ADAL" clId="{AEA4D2E3-9E49-4A14-9B41-24E8B926296E}"/>
+    <pc:docChg chg="modSld">
+      <pc:chgData name="Raul Meira de Souza" userId="0b810766-76aa-4ac6-b01e-c80b8c896654" providerId="ADAL" clId="{AEA4D2E3-9E49-4A14-9B41-24E8B926296E}" dt="2023-04-10T23:41:01.706" v="1" actId="1076"/>
+      <pc:docMkLst>
+        <pc:docMk/>
+      </pc:docMkLst>
+      <pc:sldChg chg="modSp mod">
+        <pc:chgData name="Raul Meira de Souza" userId="0b810766-76aa-4ac6-b01e-c80b8c896654" providerId="ADAL" clId="{AEA4D2E3-9E49-4A14-9B41-24E8B926296E}" dt="2023-04-10T23:41:01.706" v="1" actId="1076"/>
+        <pc:sldMkLst>
+          <pc:docMk/>
+          <pc:sldMk cId="2240095942" sldId="256"/>
+        </pc:sldMkLst>
+        <pc:spChg chg="mod">
+          <ac:chgData name="Raul Meira de Souza" userId="0b810766-76aa-4ac6-b01e-c80b8c896654" providerId="ADAL" clId="{AEA4D2E3-9E49-4A14-9B41-24E8B926296E}" dt="2023-04-10T23:41:01.706" v="1" actId="1076"/>
+          <ac:spMkLst>
+            <pc:docMk/>
+            <pc:sldMk cId="2240095942" sldId="256"/>
+            <ac:spMk id="7" creationId="{00000000-0000-0000-0000-000000000000}"/>
+          </ac:spMkLst>
+        </pc:spChg>
+      </pc:sldChg>
+    </pc:docChg>
+  </pc:docChgLst>
+</pc:chgInfo>
+</file>
+
 <file path=ppt/notesMasters/notesMaster1.xml><?xml version="1.0" encoding="utf-8"?>
 <p:notesMaster xmlns:a="http://schemas.openxmlformats.org/drawingml/2006/main" xmlns:r="http://schemas.openxmlformats.org/officeDocument/2006/relationships" xmlns:p="http://schemas.openxmlformats.org/presentationml/2006/main">
   <p:cSld>
@@ -204,7 +233,7 @@
           <a:p>
             <a:fld id="{7D40EF6F-1592-4050-BBD0-2064B3DD7FBF}" type="datetimeFigureOut">
               <a:rPr lang="pt-BR" smtClean="0"/>
-              <a:t>24/02/2023</a:t>
+              <a:t>10/04/2023</a:t>
             </a:fld>
             <a:endParaRPr lang="pt-BR"/>
           </a:p>
@@ -600,7 +629,7 @@
           <a:p>
             <a:fld id="{61B37EE8-A883-444E-BE8F-0E057BCB7369}" type="datetimeFigureOut">
               <a:rPr lang="pt-BR" smtClean="0"/>
-              <a:t>24/02/2023</a:t>
+              <a:t>10/04/2023</a:t>
             </a:fld>
             <a:endParaRPr lang="pt-BR"/>
           </a:p>
@@ -768,7 +797,7 @@
           <a:p>
             <a:fld id="{61B37EE8-A883-444E-BE8F-0E057BCB7369}" type="datetimeFigureOut">
               <a:rPr lang="pt-BR" smtClean="0"/>
-              <a:t>24/02/2023</a:t>
+              <a:t>10/04/2023</a:t>
             </a:fld>
             <a:endParaRPr lang="pt-BR"/>
           </a:p>
@@ -946,7 +975,7 @@
           <a:p>
             <a:fld id="{61B37EE8-A883-444E-BE8F-0E057BCB7369}" type="datetimeFigureOut">
               <a:rPr lang="pt-BR" smtClean="0"/>
-              <a:t>24/02/2023</a:t>
+              <a:t>10/04/2023</a:t>
             </a:fld>
             <a:endParaRPr lang="pt-BR"/>
           </a:p>
@@ -1114,7 +1143,7 @@
           <a:p>
             <a:fld id="{61B37EE8-A883-444E-BE8F-0E057BCB7369}" type="datetimeFigureOut">
               <a:rPr lang="pt-BR" smtClean="0"/>
-              <a:t>24/02/2023</a:t>
+              <a:t>10/04/2023</a:t>
             </a:fld>
             <a:endParaRPr lang="pt-BR"/>
           </a:p>
@@ -1359,7 +1388,7 @@
           <a:p>
             <a:fld id="{61B37EE8-A883-444E-BE8F-0E057BCB7369}" type="datetimeFigureOut">
               <a:rPr lang="pt-BR" smtClean="0"/>
-              <a:t>24/02/2023</a:t>
+              <a:t>10/04/2023</a:t>
             </a:fld>
             <a:endParaRPr lang="pt-BR"/>
           </a:p>
@@ -1588,7 +1617,7 @@
           <a:p>
             <a:fld id="{61B37EE8-A883-444E-BE8F-0E057BCB7369}" type="datetimeFigureOut">
               <a:rPr lang="pt-BR" smtClean="0"/>
-              <a:t>24/02/2023</a:t>
+              <a:t>10/04/2023</a:t>
             </a:fld>
             <a:endParaRPr lang="pt-BR"/>
           </a:p>
@@ -1952,7 +1981,7 @@
           <a:p>
             <a:fld id="{61B37EE8-A883-444E-BE8F-0E057BCB7369}" type="datetimeFigureOut">
               <a:rPr lang="pt-BR" smtClean="0"/>
-              <a:t>24/02/2023</a:t>
+              <a:t>10/04/2023</a:t>
             </a:fld>
             <a:endParaRPr lang="pt-BR"/>
           </a:p>
@@ -2069,7 +2098,7 @@
           <a:p>
             <a:fld id="{61B37EE8-A883-444E-BE8F-0E057BCB7369}" type="datetimeFigureOut">
               <a:rPr lang="pt-BR" smtClean="0"/>
-              <a:t>24/02/2023</a:t>
+              <a:t>10/04/2023</a:t>
             </a:fld>
             <a:endParaRPr lang="pt-BR"/>
           </a:p>
@@ -2164,7 +2193,7 @@
           <a:p>
             <a:fld id="{61B37EE8-A883-444E-BE8F-0E057BCB7369}" type="datetimeFigureOut">
               <a:rPr lang="pt-BR" smtClean="0"/>
-              <a:t>24/02/2023</a:t>
+              <a:t>10/04/2023</a:t>
             </a:fld>
             <a:endParaRPr lang="pt-BR"/>
           </a:p>
@@ -2439,7 +2468,7 @@
           <a:p>
             <a:fld id="{61B37EE8-A883-444E-BE8F-0E057BCB7369}" type="datetimeFigureOut">
               <a:rPr lang="pt-BR" smtClean="0"/>
-              <a:t>24/02/2023</a:t>
+              <a:t>10/04/2023</a:t>
             </a:fld>
             <a:endParaRPr lang="pt-BR"/>
           </a:p>
@@ -2691,7 +2720,7 @@
           <a:p>
             <a:fld id="{61B37EE8-A883-444E-BE8F-0E057BCB7369}" type="datetimeFigureOut">
               <a:rPr lang="pt-BR" smtClean="0"/>
-              <a:t>24/02/2023</a:t>
+              <a:t>10/04/2023</a:t>
             </a:fld>
             <a:endParaRPr lang="pt-BR"/>
           </a:p>
@@ -2902,7 +2931,7 @@
           <a:p>
             <a:fld id="{61B37EE8-A883-444E-BE8F-0E057BCB7369}" type="datetimeFigureOut">
               <a:rPr lang="pt-BR" smtClean="0"/>
-              <a:t>24/02/2023</a:t>
+              <a:t>10/04/2023</a:t>
             </a:fld>
             <a:endParaRPr lang="pt-BR"/>
           </a:p>
@@ -3372,7 +3401,7 @@
         </p:nvSpPr>
         <p:spPr>
           <a:xfrm>
-            <a:off x="5169136" y="5277679"/>
+            <a:off x="3398075" y="4201577"/>
             <a:ext cx="1694695" cy="1477328"/>
           </a:xfrm>
           <a:prstGeom prst="rect">

</xml_diff>